<commit_message>
added spec for watefilling
</commit_message>
<xml_diff>
--- a/specs/flowcharts.pptx
+++ b/specs/flowcharts.pptx
@@ -8,6 +8,7 @@
     <p:sldId id="256" r:id="rId2"/>
     <p:sldId id="257" r:id="rId3"/>
     <p:sldId id="258" r:id="rId4"/>
+    <p:sldId id="259" r:id="rId5"/>
   </p:sldIdLst>
   <p:sldSz cx="12192000" cy="6858000"/>
   <p:notesSz cx="6858000" cy="9144000"/>
@@ -4319,48 +4320,48 @@
     </dgm:pt>
   </dgm:ptLst>
   <dgm:cxnLst>
+    <dgm:cxn modelId="{79188201-4BBD-624A-ADE9-C0E84DEA097D}" type="presOf" srcId="{D7E6B9EF-2A71-BD4A-AD65-773A37FAFA93}" destId="{E3EEE496-0FE4-824D-8D8F-678990934CE9}" srcOrd="0" destOrd="0" presId="urn:microsoft.com/office/officeart/2005/8/layout/hierarchy6"/>
+    <dgm:cxn modelId="{39EA5421-619F-EC4E-A110-5F70FAB8EEA2}" type="presOf" srcId="{DEF2D414-B03C-4245-A6F9-50ABAFA64F46}" destId="{0B617840-B5E7-A349-907C-C3A143C3AA31}" srcOrd="0" destOrd="0" presId="urn:microsoft.com/office/officeart/2005/8/layout/hierarchy6"/>
+    <dgm:cxn modelId="{5C9B1E1E-001C-034B-B49C-8FA430087B4A}" srcId="{B0C5D86A-2CFB-F248-B124-C16ADE6005C3}" destId="{E8794C75-BBE2-784D-B58F-DEFDAF13AA26}" srcOrd="0" destOrd="0" parTransId="{5392CEEC-CCA8-0543-B9BE-9979FB205C84}" sibTransId="{290F11FF-8D02-D944-8CBB-C9EA02D3DD3F}"/>
     <dgm:cxn modelId="{F5B6D1F2-8391-594F-8BDE-5FFADFA1493B}" srcId="{DEF2D414-B03C-4245-A6F9-50ABAFA64F46}" destId="{0068B29A-180B-7842-BD39-2F527957731E}" srcOrd="1" destOrd="0" parTransId="{DB26F846-6AE1-5D45-A39A-4664B3D0FA3A}" sibTransId="{17BEB3B6-D75B-F744-A220-AAF592A85B28}"/>
-    <dgm:cxn modelId="{5C9B1E1E-001C-034B-B49C-8FA430087B4A}" srcId="{B0C5D86A-2CFB-F248-B124-C16ADE6005C3}" destId="{E8794C75-BBE2-784D-B58F-DEFDAF13AA26}" srcOrd="0" destOrd="0" parTransId="{5392CEEC-CCA8-0543-B9BE-9979FB205C84}" sibTransId="{290F11FF-8D02-D944-8CBB-C9EA02D3DD3F}"/>
+    <dgm:cxn modelId="{7988AC3B-F56D-B043-B9EC-9A5622B352E7}" type="presOf" srcId="{FD379820-FD19-8040-99B0-70A29DCAEAB9}" destId="{EC8A0E9E-C2EE-E046-A0B2-EA230A3B261A}" srcOrd="0" destOrd="0" presId="urn:microsoft.com/office/officeart/2005/8/layout/hierarchy6"/>
+    <dgm:cxn modelId="{8BB1BD03-4999-7642-A8E3-6826B5B1D548}" type="presOf" srcId="{0A304C51-05EB-1C4D-BBDD-747EB6D9D918}" destId="{EB2D02FE-FE37-1F46-A270-A06E82DEDB1F}" srcOrd="0" destOrd="0" presId="urn:microsoft.com/office/officeart/2005/8/layout/hierarchy6"/>
+    <dgm:cxn modelId="{803D9D19-BD96-684E-A990-E431B76C637C}" srcId="{8B739931-EA92-7543-AEAC-82D269F53173}" destId="{B0C5D86A-2CFB-F248-B124-C16ADE6005C3}" srcOrd="0" destOrd="0" parTransId="{FD379820-FD19-8040-99B0-70A29DCAEAB9}" sibTransId="{B5AA7B04-8A84-B24A-8093-9C666BA13C38}"/>
+    <dgm:cxn modelId="{2BBB6ED6-82FB-9246-8B42-68F8176ECFB7}" srcId="{D831BAFD-E2A1-3049-8656-39CB55C68085}" destId="{A850072A-20F5-7742-B24F-CAD00B10DE84}" srcOrd="1" destOrd="0" parTransId="{F7EEA605-21C8-E845-8CC4-9AFD7E462438}" sibTransId="{7384E857-B5DE-4D4C-9E8A-4182925108FA}"/>
+    <dgm:cxn modelId="{9C2FB992-2621-F441-AF4E-C0EB42C24C51}" srcId="{E8794C75-BBE2-784D-B58F-DEFDAF13AA26}" destId="{E3BD955D-1596-D244-8B7D-61D537624A8E}" srcOrd="1" destOrd="0" parTransId="{ADC5EC64-9BB8-7E4D-9823-312ADF9D84FF}" sibTransId="{53D66490-41E4-764D-B453-D95627E89036}"/>
+    <dgm:cxn modelId="{EE875112-DA4C-A44D-B7B9-C8E297641D47}" type="presOf" srcId="{F7EEA605-21C8-E845-8CC4-9AFD7E462438}" destId="{4FB52583-793A-9E4A-9703-01E46D3EB26C}" srcOrd="0" destOrd="0" presId="urn:microsoft.com/office/officeart/2005/8/layout/hierarchy6"/>
+    <dgm:cxn modelId="{AA737E6F-6433-0A49-8E8F-265120D21AED}" type="presOf" srcId="{8B739931-EA92-7543-AEAC-82D269F53173}" destId="{58747F35-10A6-1947-AFCE-29CBA92C8B51}" srcOrd="0" destOrd="0" presId="urn:microsoft.com/office/officeart/2005/8/layout/hierarchy6"/>
+    <dgm:cxn modelId="{04649E56-9719-9A40-A17C-8C71671B1C58}" type="presOf" srcId="{76733F12-08B5-694B-B923-386C546ADE54}" destId="{E83AB7A9-EE0B-944B-8ECA-7A0856D26ED3}" srcOrd="0" destOrd="0" presId="urn:microsoft.com/office/officeart/2005/8/layout/hierarchy6"/>
+    <dgm:cxn modelId="{FCDEFA12-7F39-4D44-A92E-3E2EC664AB23}" type="presOf" srcId="{CA7BE6EE-1CF2-0945-B24D-4C77A708AAD9}" destId="{2FABBC2E-5D6F-5B4E-B686-C3FE5F869D36}" srcOrd="0" destOrd="0" presId="urn:microsoft.com/office/officeart/2005/8/layout/hierarchy6"/>
+    <dgm:cxn modelId="{3EEE73A0-F15A-854A-BD3A-3BA9A2C4D0CB}" srcId="{C64FFA04-6734-C643-861E-EDE8F10AD558}" destId="{A4A82791-6E49-5D4F-B328-05DEB0EB67A9}" srcOrd="0" destOrd="0" parTransId="{68269203-CA50-CC4C-8D0B-EE1F028FB7BC}" sibTransId="{DA85DE68-9AB9-0349-A4DB-FB38022F94A7}"/>
+    <dgm:cxn modelId="{B7AA7789-21E3-E148-A017-A04B77660A7D}" srcId="{D831BAFD-E2A1-3049-8656-39CB55C68085}" destId="{76733F12-08B5-694B-B923-386C546ADE54}" srcOrd="0" destOrd="0" parTransId="{65100B1D-FE9A-F149-AD80-48752E92207E}" sibTransId="{87592DA9-2560-C846-9700-817951DCDB58}"/>
+    <dgm:cxn modelId="{796E2CA5-FE71-DD41-8136-20E78647FF38}" type="presOf" srcId="{37AE72DE-E4E6-6C49-8AA5-A9D7EE0E2310}" destId="{05779350-394B-7B43-A952-E0A8F673A0B9}" srcOrd="0" destOrd="0" presId="urn:microsoft.com/office/officeart/2005/8/layout/hierarchy6"/>
+    <dgm:cxn modelId="{40F12093-5C8A-8446-B747-8385BAA3E7AE}" srcId="{DEF2D414-B03C-4245-A6F9-50ABAFA64F46}" destId="{D7E6B9EF-2A71-BD4A-AD65-773A37FAFA93}" srcOrd="0" destOrd="0" parTransId="{0A304C51-05EB-1C4D-BBDD-747EB6D9D918}" sibTransId="{30FE0181-FE28-C847-B8A1-8F7A1BC612C7}"/>
+    <dgm:cxn modelId="{A5C58DC6-0C69-6F47-ABAC-2D0DF2B05950}" type="presOf" srcId="{ADC5EC64-9BB8-7E4D-9823-312ADF9D84FF}" destId="{F72719EC-DEB3-094A-B64E-9610B5A3B854}" srcOrd="0" destOrd="0" presId="urn:microsoft.com/office/officeart/2005/8/layout/hierarchy6"/>
+    <dgm:cxn modelId="{07CAE1EE-A2A4-964D-AC59-4824314584AE}" type="presOf" srcId="{4574A7BE-0422-264F-9D34-062717CC9A7B}" destId="{3F6FD9C3-51AD-2C4D-B31D-1F42CD38DFBA}" srcOrd="0" destOrd="0" presId="urn:microsoft.com/office/officeart/2005/8/layout/hierarchy6"/>
+    <dgm:cxn modelId="{BC399B45-17B0-EF45-9918-0732164F7175}" srcId="{E8794C75-BBE2-784D-B58F-DEFDAF13AA26}" destId="{DEF2D414-B03C-4245-A6F9-50ABAFA64F46}" srcOrd="0" destOrd="0" parTransId="{CA7BE6EE-1CF2-0945-B24D-4C77A708AAD9}" sibTransId="{F056A8A7-CBC6-F344-B82C-4CBD216E4F63}"/>
+    <dgm:cxn modelId="{D0FD655D-F21A-ED47-ADBD-F9A1D50A7F1C}" type="presOf" srcId="{7683373D-42BD-BF4E-8B83-DE3C48707651}" destId="{74F597F4-2813-E340-ADC9-CEF8A13DFBD2}" srcOrd="0" destOrd="0" presId="urn:microsoft.com/office/officeart/2005/8/layout/hierarchy6"/>
+    <dgm:cxn modelId="{CF01E954-BBD5-9E42-989B-0FDD77812B73}" type="presOf" srcId="{DB26F846-6AE1-5D45-A39A-4664B3D0FA3A}" destId="{DB540A59-56FE-2D4C-864D-8E29D0AE19CD}" srcOrd="0" destOrd="0" presId="urn:microsoft.com/office/officeart/2005/8/layout/hierarchy6"/>
+    <dgm:cxn modelId="{16F33ACE-2962-F649-B875-600073CD8D8A}" type="presOf" srcId="{A850072A-20F5-7742-B24F-CAD00B10DE84}" destId="{F27770AC-50B2-2F4D-B1E9-3C8BB90CAE15}" srcOrd="0" destOrd="0" presId="urn:microsoft.com/office/officeart/2005/8/layout/hierarchy6"/>
+    <dgm:cxn modelId="{3D58C099-187D-8C49-BDC8-4362398CEF86}" srcId="{A850072A-20F5-7742-B24F-CAD00B10DE84}" destId="{ECB82084-9B01-A74B-8E27-2EB579B24F5C}" srcOrd="0" destOrd="0" parTransId="{37AE72DE-E4E6-6C49-8AA5-A9D7EE0E2310}" sibTransId="{27BE778A-7527-9141-95C4-460DFD56B38B}"/>
+    <dgm:cxn modelId="{871BA14E-1F47-B64E-AB64-C01E6129E3AC}" type="presOf" srcId="{65100B1D-FE9A-F149-AD80-48752E92207E}" destId="{91130677-5459-B44C-8804-DE5A35BDAB35}" srcOrd="0" destOrd="0" presId="urn:microsoft.com/office/officeart/2005/8/layout/hierarchy6"/>
+    <dgm:cxn modelId="{B12E2C25-71E8-D041-A7F6-DFF68E763724}" type="presOf" srcId="{B0C5D86A-2CFB-F248-B124-C16ADE6005C3}" destId="{881F0F6F-5636-E54A-A9A5-1EF000AE4727}" srcOrd="0" destOrd="0" presId="urn:microsoft.com/office/officeart/2005/8/layout/hierarchy6"/>
+    <dgm:cxn modelId="{5D4CFEFC-8577-2743-9D73-D515F3A0037D}" srcId="{E3BD955D-1596-D244-8B7D-61D537624A8E}" destId="{84DF221C-31AD-ED42-8964-49D34D567680}" srcOrd="0" destOrd="0" parTransId="{283BCC41-1AFA-354E-B60A-424EA2DCA263}" sibTransId="{3F2FC631-F0B4-7C41-B76E-BC8439E5B279}"/>
+    <dgm:cxn modelId="{867CC143-7F22-FF4A-9BEF-F82235062300}" type="presOf" srcId="{E8794C75-BBE2-784D-B58F-DEFDAF13AA26}" destId="{BA44287B-2A25-CC40-AD33-610B251DB1B1}" srcOrd="0" destOrd="0" presId="urn:microsoft.com/office/officeart/2005/8/layout/hierarchy6"/>
+    <dgm:cxn modelId="{B17CBF15-8132-EF42-A430-27F3A2F79988}" srcId="{7683373D-42BD-BF4E-8B83-DE3C48707651}" destId="{D831BAFD-E2A1-3049-8656-39CB55C68085}" srcOrd="0" destOrd="0" parTransId="{8C703158-0A03-A049-A8AA-573705483F30}" sibTransId="{D9ACBC70-8D22-5147-9CE6-A9E1D316DC1B}"/>
+    <dgm:cxn modelId="{F71F4912-8C47-494C-BD54-B42363984CEB}" srcId="{76733F12-08B5-694B-B923-386C546ADE54}" destId="{8B739931-EA92-7543-AEAC-82D269F53173}" srcOrd="0" destOrd="0" parTransId="{4574A7BE-0422-264F-9D34-062717CC9A7B}" sibTransId="{9FFCFB02-467E-CD41-8EF8-50383244EC1E}"/>
+    <dgm:cxn modelId="{1D85D1D1-3EB7-4642-B90C-9FAA1E27ECB0}" type="presOf" srcId="{68269203-CA50-CC4C-8D0B-EE1F028FB7BC}" destId="{DEB3989B-67AF-7341-B0A7-6BF7FEB96C98}" srcOrd="0" destOrd="0" presId="urn:microsoft.com/office/officeart/2005/8/layout/hierarchy6"/>
+    <dgm:cxn modelId="{6BABC1E8-5A0B-4041-A6B6-AFD55F86B753}" type="presOf" srcId="{A4A82791-6E49-5D4F-B328-05DEB0EB67A9}" destId="{946321A6-1BC8-A446-BA51-7A8DD6518F31}" srcOrd="0" destOrd="0" presId="urn:microsoft.com/office/officeart/2005/8/layout/hierarchy6"/>
+    <dgm:cxn modelId="{48E945F8-4375-E54A-8BDC-F110C56E8440}" type="presOf" srcId="{D3AC2D69-700B-A94D-84EF-FCC24D9C5D12}" destId="{BED2D602-08AE-DC42-91CC-9A4B88DF2B71}" srcOrd="0" destOrd="0" presId="urn:microsoft.com/office/officeart/2005/8/layout/hierarchy6"/>
+    <dgm:cxn modelId="{A67F4CDB-D320-B643-94A4-0907F7FA3C78}" type="presOf" srcId="{283BCC41-1AFA-354E-B60A-424EA2DCA263}" destId="{3301802D-A3C2-6C40-A5D9-4D0770C51F62}" srcOrd="0" destOrd="0" presId="urn:microsoft.com/office/officeart/2005/8/layout/hierarchy6"/>
+    <dgm:cxn modelId="{94CAD104-B3BA-E34E-988C-65972F8236F8}" srcId="{76733F12-08B5-694B-B923-386C546ADE54}" destId="{C64FFA04-6734-C643-861E-EDE8F10AD558}" srcOrd="1" destOrd="0" parTransId="{D3AC2D69-700B-A94D-84EF-FCC24D9C5D12}" sibTransId="{8BA7124F-8308-E64A-AA30-69CC2CBD3E97}"/>
+    <dgm:cxn modelId="{23B60A7C-FD96-9749-9646-E86DF838F39E}" type="presOf" srcId="{0068B29A-180B-7842-BD39-2F527957731E}" destId="{D98F194C-C27F-C34D-892C-80EF2CAFD9F2}" srcOrd="0" destOrd="0" presId="urn:microsoft.com/office/officeart/2005/8/layout/hierarchy6"/>
+    <dgm:cxn modelId="{B619523C-8F43-0D42-B1A4-EC942E813D97}" type="presOf" srcId="{E3BD955D-1596-D244-8B7D-61D537624A8E}" destId="{95A7E616-301E-DE4B-B411-6FC244BBE752}" srcOrd="0" destOrd="0" presId="urn:microsoft.com/office/officeart/2005/8/layout/hierarchy6"/>
+    <dgm:cxn modelId="{DF10665A-AB88-C843-B10A-DC56E583B436}" type="presOf" srcId="{D831BAFD-E2A1-3049-8656-39CB55C68085}" destId="{4EA2EBF1-0575-704E-A030-D1C7F22DF5A2}" srcOrd="0" destOrd="0" presId="urn:microsoft.com/office/officeart/2005/8/layout/hierarchy6"/>
+    <dgm:cxn modelId="{55AE087F-58EE-1C48-A1BA-6CBDE7010B54}" type="presOf" srcId="{5392CEEC-CCA8-0543-B9BE-9979FB205C84}" destId="{E48C12E7-7C36-6249-B9B0-E694463C6FB1}" srcOrd="0" destOrd="0" presId="urn:microsoft.com/office/officeart/2005/8/layout/hierarchy6"/>
+    <dgm:cxn modelId="{7AC03326-7FC7-854C-8F76-D0D4948DCEF6}" type="presOf" srcId="{ECB82084-9B01-A74B-8E27-2EB579B24F5C}" destId="{6C49A1A4-A5A3-5840-BEE4-EDDCA7646D2B}" srcOrd="0" destOrd="0" presId="urn:microsoft.com/office/officeart/2005/8/layout/hierarchy6"/>
+    <dgm:cxn modelId="{C22B1758-71D0-3B43-B81C-4B6430D7A572}" type="presOf" srcId="{84DF221C-31AD-ED42-8964-49D34D567680}" destId="{1DB4CA27-7E59-D148-9738-21B7C903102F}" srcOrd="0" destOrd="0" presId="urn:microsoft.com/office/officeart/2005/8/layout/hierarchy6"/>
     <dgm:cxn modelId="{D5D3E1E0-593F-B54F-8D06-DC808C435EB0}" type="presOf" srcId="{C64FFA04-6734-C643-861E-EDE8F10AD558}" destId="{976CF1EA-7BEC-7B40-B754-15881FF6E983}" srcOrd="0" destOrd="0" presId="urn:microsoft.com/office/officeart/2005/8/layout/hierarchy6"/>
-    <dgm:cxn modelId="{FCDEFA12-7F39-4D44-A92E-3E2EC664AB23}" type="presOf" srcId="{CA7BE6EE-1CF2-0945-B24D-4C77A708AAD9}" destId="{2FABBC2E-5D6F-5B4E-B686-C3FE5F869D36}" srcOrd="0" destOrd="0" presId="urn:microsoft.com/office/officeart/2005/8/layout/hierarchy6"/>
-    <dgm:cxn modelId="{9C2FB992-2621-F441-AF4E-C0EB42C24C51}" srcId="{E8794C75-BBE2-784D-B58F-DEFDAF13AA26}" destId="{E3BD955D-1596-D244-8B7D-61D537624A8E}" srcOrd="1" destOrd="0" parTransId="{ADC5EC64-9BB8-7E4D-9823-312ADF9D84FF}" sibTransId="{53D66490-41E4-764D-B453-D95627E89036}"/>
-    <dgm:cxn modelId="{BC399B45-17B0-EF45-9918-0732164F7175}" srcId="{E8794C75-BBE2-784D-B58F-DEFDAF13AA26}" destId="{DEF2D414-B03C-4245-A6F9-50ABAFA64F46}" srcOrd="0" destOrd="0" parTransId="{CA7BE6EE-1CF2-0945-B24D-4C77A708AAD9}" sibTransId="{F056A8A7-CBC6-F344-B82C-4CBD216E4F63}"/>
-    <dgm:cxn modelId="{871BA14E-1F47-B64E-AB64-C01E6129E3AC}" type="presOf" srcId="{65100B1D-FE9A-F149-AD80-48752E92207E}" destId="{91130677-5459-B44C-8804-DE5A35BDAB35}" srcOrd="0" destOrd="0" presId="urn:microsoft.com/office/officeart/2005/8/layout/hierarchy6"/>
-    <dgm:cxn modelId="{867CC143-7F22-FF4A-9BEF-F82235062300}" type="presOf" srcId="{E8794C75-BBE2-784D-B58F-DEFDAF13AA26}" destId="{BA44287B-2A25-CC40-AD33-610B251DB1B1}" srcOrd="0" destOrd="0" presId="urn:microsoft.com/office/officeart/2005/8/layout/hierarchy6"/>
-    <dgm:cxn modelId="{EE875112-DA4C-A44D-B7B9-C8E297641D47}" type="presOf" srcId="{F7EEA605-21C8-E845-8CC4-9AFD7E462438}" destId="{4FB52583-793A-9E4A-9703-01E46D3EB26C}" srcOrd="0" destOrd="0" presId="urn:microsoft.com/office/officeart/2005/8/layout/hierarchy6"/>
-    <dgm:cxn modelId="{B619523C-8F43-0D42-B1A4-EC942E813D97}" type="presOf" srcId="{E3BD955D-1596-D244-8B7D-61D537624A8E}" destId="{95A7E616-301E-DE4B-B411-6FC244BBE752}" srcOrd="0" destOrd="0" presId="urn:microsoft.com/office/officeart/2005/8/layout/hierarchy6"/>
-    <dgm:cxn modelId="{F71F4912-8C47-494C-BD54-B42363984CEB}" srcId="{76733F12-08B5-694B-B923-386C546ADE54}" destId="{8B739931-EA92-7543-AEAC-82D269F53173}" srcOrd="0" destOrd="0" parTransId="{4574A7BE-0422-264F-9D34-062717CC9A7B}" sibTransId="{9FFCFB02-467E-CD41-8EF8-50383244EC1E}"/>
-    <dgm:cxn modelId="{23B60A7C-FD96-9749-9646-E86DF838F39E}" type="presOf" srcId="{0068B29A-180B-7842-BD39-2F527957731E}" destId="{D98F194C-C27F-C34D-892C-80EF2CAFD9F2}" srcOrd="0" destOrd="0" presId="urn:microsoft.com/office/officeart/2005/8/layout/hierarchy6"/>
-    <dgm:cxn modelId="{79188201-4BBD-624A-ADE9-C0E84DEA097D}" type="presOf" srcId="{D7E6B9EF-2A71-BD4A-AD65-773A37FAFA93}" destId="{E3EEE496-0FE4-824D-8D8F-678990934CE9}" srcOrd="0" destOrd="0" presId="urn:microsoft.com/office/officeart/2005/8/layout/hierarchy6"/>
-    <dgm:cxn modelId="{94CAD104-B3BA-E34E-988C-65972F8236F8}" srcId="{76733F12-08B5-694B-B923-386C546ADE54}" destId="{C64FFA04-6734-C643-861E-EDE8F10AD558}" srcOrd="1" destOrd="0" parTransId="{D3AC2D69-700B-A94D-84EF-FCC24D9C5D12}" sibTransId="{8BA7124F-8308-E64A-AA30-69CC2CBD3E97}"/>
-    <dgm:cxn modelId="{5D4CFEFC-8577-2743-9D73-D515F3A0037D}" srcId="{E3BD955D-1596-D244-8B7D-61D537624A8E}" destId="{84DF221C-31AD-ED42-8964-49D34D567680}" srcOrd="0" destOrd="0" parTransId="{283BCC41-1AFA-354E-B60A-424EA2DCA263}" sibTransId="{3F2FC631-F0B4-7C41-B76E-BC8439E5B279}"/>
-    <dgm:cxn modelId="{16F33ACE-2962-F649-B875-600073CD8D8A}" type="presOf" srcId="{A850072A-20F5-7742-B24F-CAD00B10DE84}" destId="{F27770AC-50B2-2F4D-B1E9-3C8BB90CAE15}" srcOrd="0" destOrd="0" presId="urn:microsoft.com/office/officeart/2005/8/layout/hierarchy6"/>
-    <dgm:cxn modelId="{07CAE1EE-A2A4-964D-AC59-4824314584AE}" type="presOf" srcId="{4574A7BE-0422-264F-9D34-062717CC9A7B}" destId="{3F6FD9C3-51AD-2C4D-B31D-1F42CD38DFBA}" srcOrd="0" destOrd="0" presId="urn:microsoft.com/office/officeart/2005/8/layout/hierarchy6"/>
-    <dgm:cxn modelId="{40F12093-5C8A-8446-B747-8385BAA3E7AE}" srcId="{DEF2D414-B03C-4245-A6F9-50ABAFA64F46}" destId="{D7E6B9EF-2A71-BD4A-AD65-773A37FAFA93}" srcOrd="0" destOrd="0" parTransId="{0A304C51-05EB-1C4D-BBDD-747EB6D9D918}" sibTransId="{30FE0181-FE28-C847-B8A1-8F7A1BC612C7}"/>
-    <dgm:cxn modelId="{8BB1BD03-4999-7642-A8E3-6826B5B1D548}" type="presOf" srcId="{0A304C51-05EB-1C4D-BBDD-747EB6D9D918}" destId="{EB2D02FE-FE37-1F46-A270-A06E82DEDB1F}" srcOrd="0" destOrd="0" presId="urn:microsoft.com/office/officeart/2005/8/layout/hierarchy6"/>
-    <dgm:cxn modelId="{A67F4CDB-D320-B643-94A4-0907F7FA3C78}" type="presOf" srcId="{283BCC41-1AFA-354E-B60A-424EA2DCA263}" destId="{3301802D-A3C2-6C40-A5D9-4D0770C51F62}" srcOrd="0" destOrd="0" presId="urn:microsoft.com/office/officeart/2005/8/layout/hierarchy6"/>
-    <dgm:cxn modelId="{C22B1758-71D0-3B43-B81C-4B6430D7A572}" type="presOf" srcId="{84DF221C-31AD-ED42-8964-49D34D567680}" destId="{1DB4CA27-7E59-D148-9738-21B7C903102F}" srcOrd="0" destOrd="0" presId="urn:microsoft.com/office/officeart/2005/8/layout/hierarchy6"/>
-    <dgm:cxn modelId="{B12E2C25-71E8-D041-A7F6-DFF68E763724}" type="presOf" srcId="{B0C5D86A-2CFB-F248-B124-C16ADE6005C3}" destId="{881F0F6F-5636-E54A-A9A5-1EF000AE4727}" srcOrd="0" destOrd="0" presId="urn:microsoft.com/office/officeart/2005/8/layout/hierarchy6"/>
-    <dgm:cxn modelId="{3D58C099-187D-8C49-BDC8-4362398CEF86}" srcId="{A850072A-20F5-7742-B24F-CAD00B10DE84}" destId="{ECB82084-9B01-A74B-8E27-2EB579B24F5C}" srcOrd="0" destOrd="0" parTransId="{37AE72DE-E4E6-6C49-8AA5-A9D7EE0E2310}" sibTransId="{27BE778A-7527-9141-95C4-460DFD56B38B}"/>
-    <dgm:cxn modelId="{B7AA7789-21E3-E148-A017-A04B77660A7D}" srcId="{D831BAFD-E2A1-3049-8656-39CB55C68085}" destId="{76733F12-08B5-694B-B923-386C546ADE54}" srcOrd="0" destOrd="0" parTransId="{65100B1D-FE9A-F149-AD80-48752E92207E}" sibTransId="{87592DA9-2560-C846-9700-817951DCDB58}"/>
-    <dgm:cxn modelId="{DF10665A-AB88-C843-B10A-DC56E583B436}" type="presOf" srcId="{D831BAFD-E2A1-3049-8656-39CB55C68085}" destId="{4EA2EBF1-0575-704E-A030-D1C7F22DF5A2}" srcOrd="0" destOrd="0" presId="urn:microsoft.com/office/officeart/2005/8/layout/hierarchy6"/>
-    <dgm:cxn modelId="{7AC03326-7FC7-854C-8F76-D0D4948DCEF6}" type="presOf" srcId="{ECB82084-9B01-A74B-8E27-2EB579B24F5C}" destId="{6C49A1A4-A5A3-5840-BEE4-EDDCA7646D2B}" srcOrd="0" destOrd="0" presId="urn:microsoft.com/office/officeart/2005/8/layout/hierarchy6"/>
-    <dgm:cxn modelId="{B17CBF15-8132-EF42-A430-27F3A2F79988}" srcId="{7683373D-42BD-BF4E-8B83-DE3C48707651}" destId="{D831BAFD-E2A1-3049-8656-39CB55C68085}" srcOrd="0" destOrd="0" parTransId="{8C703158-0A03-A049-A8AA-573705483F30}" sibTransId="{D9ACBC70-8D22-5147-9CE6-A9E1D316DC1B}"/>
-    <dgm:cxn modelId="{6BABC1E8-5A0B-4041-A6B6-AFD55F86B753}" type="presOf" srcId="{A4A82791-6E49-5D4F-B328-05DEB0EB67A9}" destId="{946321A6-1BC8-A446-BA51-7A8DD6518F31}" srcOrd="0" destOrd="0" presId="urn:microsoft.com/office/officeart/2005/8/layout/hierarchy6"/>
-    <dgm:cxn modelId="{3EEE73A0-F15A-854A-BD3A-3BA9A2C4D0CB}" srcId="{C64FFA04-6734-C643-861E-EDE8F10AD558}" destId="{A4A82791-6E49-5D4F-B328-05DEB0EB67A9}" srcOrd="0" destOrd="0" parTransId="{68269203-CA50-CC4C-8D0B-EE1F028FB7BC}" sibTransId="{DA85DE68-9AB9-0349-A4DB-FB38022F94A7}"/>
-    <dgm:cxn modelId="{CF01E954-BBD5-9E42-989B-0FDD77812B73}" type="presOf" srcId="{DB26F846-6AE1-5D45-A39A-4664B3D0FA3A}" destId="{DB540A59-56FE-2D4C-864D-8E29D0AE19CD}" srcOrd="0" destOrd="0" presId="urn:microsoft.com/office/officeart/2005/8/layout/hierarchy6"/>
-    <dgm:cxn modelId="{796E2CA5-FE71-DD41-8136-20E78647FF38}" type="presOf" srcId="{37AE72DE-E4E6-6C49-8AA5-A9D7EE0E2310}" destId="{05779350-394B-7B43-A952-E0A8F673A0B9}" srcOrd="0" destOrd="0" presId="urn:microsoft.com/office/officeart/2005/8/layout/hierarchy6"/>
-    <dgm:cxn modelId="{39EA5421-619F-EC4E-A110-5F70FAB8EEA2}" type="presOf" srcId="{DEF2D414-B03C-4245-A6F9-50ABAFA64F46}" destId="{0B617840-B5E7-A349-907C-C3A143C3AA31}" srcOrd="0" destOrd="0" presId="urn:microsoft.com/office/officeart/2005/8/layout/hierarchy6"/>
-    <dgm:cxn modelId="{D0FD655D-F21A-ED47-ADBD-F9A1D50A7F1C}" type="presOf" srcId="{7683373D-42BD-BF4E-8B83-DE3C48707651}" destId="{74F597F4-2813-E340-ADC9-CEF8A13DFBD2}" srcOrd="0" destOrd="0" presId="urn:microsoft.com/office/officeart/2005/8/layout/hierarchy6"/>
-    <dgm:cxn modelId="{48E945F8-4375-E54A-8BDC-F110C56E8440}" type="presOf" srcId="{D3AC2D69-700B-A94D-84EF-FCC24D9C5D12}" destId="{BED2D602-08AE-DC42-91CC-9A4B88DF2B71}" srcOrd="0" destOrd="0" presId="urn:microsoft.com/office/officeart/2005/8/layout/hierarchy6"/>
-    <dgm:cxn modelId="{2BBB6ED6-82FB-9246-8B42-68F8176ECFB7}" srcId="{D831BAFD-E2A1-3049-8656-39CB55C68085}" destId="{A850072A-20F5-7742-B24F-CAD00B10DE84}" srcOrd="1" destOrd="0" parTransId="{F7EEA605-21C8-E845-8CC4-9AFD7E462438}" sibTransId="{7384E857-B5DE-4D4C-9E8A-4182925108FA}"/>
-    <dgm:cxn modelId="{803D9D19-BD96-684E-A990-E431B76C637C}" srcId="{8B739931-EA92-7543-AEAC-82D269F53173}" destId="{B0C5D86A-2CFB-F248-B124-C16ADE6005C3}" srcOrd="0" destOrd="0" parTransId="{FD379820-FD19-8040-99B0-70A29DCAEAB9}" sibTransId="{B5AA7B04-8A84-B24A-8093-9C666BA13C38}"/>
-    <dgm:cxn modelId="{55AE087F-58EE-1C48-A1BA-6CBDE7010B54}" type="presOf" srcId="{5392CEEC-CCA8-0543-B9BE-9979FB205C84}" destId="{E48C12E7-7C36-6249-B9B0-E694463C6FB1}" srcOrd="0" destOrd="0" presId="urn:microsoft.com/office/officeart/2005/8/layout/hierarchy6"/>
-    <dgm:cxn modelId="{AA737E6F-6433-0A49-8E8F-265120D21AED}" type="presOf" srcId="{8B739931-EA92-7543-AEAC-82D269F53173}" destId="{58747F35-10A6-1947-AFCE-29CBA92C8B51}" srcOrd="0" destOrd="0" presId="urn:microsoft.com/office/officeart/2005/8/layout/hierarchy6"/>
-    <dgm:cxn modelId="{1D85D1D1-3EB7-4642-B90C-9FAA1E27ECB0}" type="presOf" srcId="{68269203-CA50-CC4C-8D0B-EE1F028FB7BC}" destId="{DEB3989B-67AF-7341-B0A7-6BF7FEB96C98}" srcOrd="0" destOrd="0" presId="urn:microsoft.com/office/officeart/2005/8/layout/hierarchy6"/>
-    <dgm:cxn modelId="{7988AC3B-F56D-B043-B9EC-9A5622B352E7}" type="presOf" srcId="{FD379820-FD19-8040-99B0-70A29DCAEAB9}" destId="{EC8A0E9E-C2EE-E046-A0B2-EA230A3B261A}" srcOrd="0" destOrd="0" presId="urn:microsoft.com/office/officeart/2005/8/layout/hierarchy6"/>
-    <dgm:cxn modelId="{04649E56-9719-9A40-A17C-8C71671B1C58}" type="presOf" srcId="{76733F12-08B5-694B-B923-386C546ADE54}" destId="{E83AB7A9-EE0B-944B-8ECA-7A0856D26ED3}" srcOrd="0" destOrd="0" presId="urn:microsoft.com/office/officeart/2005/8/layout/hierarchy6"/>
-    <dgm:cxn modelId="{A5C58DC6-0C69-6F47-ABAC-2D0DF2B05950}" type="presOf" srcId="{ADC5EC64-9BB8-7E4D-9823-312ADF9D84FF}" destId="{F72719EC-DEB3-094A-B64E-9610B5A3B854}" srcOrd="0" destOrd="0" presId="urn:microsoft.com/office/officeart/2005/8/layout/hierarchy6"/>
     <dgm:cxn modelId="{87E05D7E-E3A1-AB41-A761-FF2A1EEA6FD0}" type="presParOf" srcId="{74F597F4-2813-E340-ADC9-CEF8A13DFBD2}" destId="{9D009637-AADB-2F4A-B5FD-50682A8B8E89}" srcOrd="0" destOrd="0" presId="urn:microsoft.com/office/officeart/2005/8/layout/hierarchy6"/>
     <dgm:cxn modelId="{176C6063-5320-3C4F-9BD0-576D19D3A959}" type="presParOf" srcId="{9D009637-AADB-2F4A-B5FD-50682A8B8E89}" destId="{2E53D21A-6C82-CA41-9F21-802FF880393D}" srcOrd="0" destOrd="0" presId="urn:microsoft.com/office/officeart/2005/8/layout/hierarchy6"/>
     <dgm:cxn modelId="{2BCB585C-C0DD-4B4F-AB2C-E0EB59AC3DC8}" type="presParOf" srcId="{2E53D21A-6C82-CA41-9F21-802FF880393D}" destId="{4845C2E1-6C4E-F140-BFDB-66FC14B7EF32}" srcOrd="0" destOrd="0" presId="urn:microsoft.com/office/officeart/2005/8/layout/hierarchy6"/>
@@ -12167,7 +12168,7 @@
           <a:p>
             <a:fld id="{7A00DDC5-A047-A044-A413-DB805296468B}" type="datetimeFigureOut">
               <a:rPr lang="en-US" smtClean="0"/>
-              <a:t>10/12/18</a:t>
+              <a:t>11/18/18</a:t>
             </a:fld>
             <a:endParaRPr lang="en-US"/>
           </a:p>
@@ -12337,7 +12338,7 @@
           <a:p>
             <a:fld id="{7A00DDC5-A047-A044-A413-DB805296468B}" type="datetimeFigureOut">
               <a:rPr lang="en-US" smtClean="0"/>
-              <a:t>10/12/18</a:t>
+              <a:t>11/18/18</a:t>
             </a:fld>
             <a:endParaRPr lang="en-US"/>
           </a:p>
@@ -12517,7 +12518,7 @@
           <a:p>
             <a:fld id="{7A00DDC5-A047-A044-A413-DB805296468B}" type="datetimeFigureOut">
               <a:rPr lang="en-US" smtClean="0"/>
-              <a:t>10/12/18</a:t>
+              <a:t>11/18/18</a:t>
             </a:fld>
             <a:endParaRPr lang="en-US"/>
           </a:p>
@@ -12687,7 +12688,7 @@
           <a:p>
             <a:fld id="{7A00DDC5-A047-A044-A413-DB805296468B}" type="datetimeFigureOut">
               <a:rPr lang="en-US" smtClean="0"/>
-              <a:t>10/12/18</a:t>
+              <a:t>11/18/18</a:t>
             </a:fld>
             <a:endParaRPr lang="en-US"/>
           </a:p>
@@ -12933,7 +12934,7 @@
           <a:p>
             <a:fld id="{7A00DDC5-A047-A044-A413-DB805296468B}" type="datetimeFigureOut">
               <a:rPr lang="en-US" smtClean="0"/>
-              <a:t>10/12/18</a:t>
+              <a:t>11/18/18</a:t>
             </a:fld>
             <a:endParaRPr lang="en-US"/>
           </a:p>
@@ -13165,7 +13166,7 @@
           <a:p>
             <a:fld id="{7A00DDC5-A047-A044-A413-DB805296468B}" type="datetimeFigureOut">
               <a:rPr lang="en-US" smtClean="0"/>
-              <a:t>10/12/18</a:t>
+              <a:t>11/18/18</a:t>
             </a:fld>
             <a:endParaRPr lang="en-US"/>
           </a:p>
@@ -13532,7 +13533,7 @@
           <a:p>
             <a:fld id="{7A00DDC5-A047-A044-A413-DB805296468B}" type="datetimeFigureOut">
               <a:rPr lang="en-US" smtClean="0"/>
-              <a:t>10/12/18</a:t>
+              <a:t>11/18/18</a:t>
             </a:fld>
             <a:endParaRPr lang="en-US"/>
           </a:p>
@@ -13650,7 +13651,7 @@
           <a:p>
             <a:fld id="{7A00DDC5-A047-A044-A413-DB805296468B}" type="datetimeFigureOut">
               <a:rPr lang="en-US" smtClean="0"/>
-              <a:t>10/12/18</a:t>
+              <a:t>11/18/18</a:t>
             </a:fld>
             <a:endParaRPr lang="en-US"/>
           </a:p>
@@ -13745,7 +13746,7 @@
           <a:p>
             <a:fld id="{7A00DDC5-A047-A044-A413-DB805296468B}" type="datetimeFigureOut">
               <a:rPr lang="en-US" smtClean="0"/>
-              <a:t>10/12/18</a:t>
+              <a:t>11/18/18</a:t>
             </a:fld>
             <a:endParaRPr lang="en-US"/>
           </a:p>
@@ -14022,7 +14023,7 @@
           <a:p>
             <a:fld id="{7A00DDC5-A047-A044-A413-DB805296468B}" type="datetimeFigureOut">
               <a:rPr lang="en-US" smtClean="0"/>
-              <a:t>10/12/18</a:t>
+              <a:t>11/18/18</a:t>
             </a:fld>
             <a:endParaRPr lang="en-US"/>
           </a:p>
@@ -14275,7 +14276,7 @@
           <a:p>
             <a:fld id="{7A00DDC5-A047-A044-A413-DB805296468B}" type="datetimeFigureOut">
               <a:rPr lang="en-US" smtClean="0"/>
-              <a:t>10/12/18</a:t>
+              <a:t>11/18/18</a:t>
             </a:fld>
             <a:endParaRPr lang="en-US"/>
           </a:p>
@@ -14488,7 +14489,7 @@
           <a:p>
             <a:fld id="{7A00DDC5-A047-A044-A413-DB805296468B}" type="datetimeFigureOut">
               <a:rPr lang="en-US" smtClean="0"/>
-              <a:t>10/12/18</a:t>
+              <a:t>11/18/18</a:t>
             </a:fld>
             <a:endParaRPr lang="en-US"/>
           </a:p>
@@ -15048,6 +15049,1467 @@
 </p:sld>
 </file>
 
+<file path=ppt/slides/slide4.xml><?xml version="1.0" encoding="utf-8"?>
+<p:sld xmlns:a="http://schemas.openxmlformats.org/drawingml/2006/main" xmlns:r="http://schemas.openxmlformats.org/officeDocument/2006/relationships" xmlns:p="http://schemas.openxmlformats.org/presentationml/2006/main">
+  <p:cSld>
+    <p:spTree>
+      <p:nvGrpSpPr>
+        <p:cNvPr id="1" name=""/>
+        <p:cNvGrpSpPr/>
+        <p:nvPr/>
+      </p:nvGrpSpPr>
+      <p:grpSpPr>
+        <a:xfrm>
+          <a:off x="0" y="0"/>
+          <a:ext cx="0" cy="0"/>
+          <a:chOff x="0" y="0"/>
+          <a:chExt cx="0" cy="0"/>
+        </a:xfrm>
+      </p:grpSpPr>
+      <p:sp>
+        <p:nvSpPr>
+          <p:cNvPr id="4" name="Oval 3"/>
+          <p:cNvSpPr/>
+          <p:nvPr/>
+        </p:nvSpPr>
+        <p:spPr>
+          <a:xfrm>
+            <a:off x="2774023" y="2804844"/>
+            <a:ext cx="452063" cy="441789"/>
+          </a:xfrm>
+          <a:prstGeom prst="ellipse">
+            <a:avLst/>
+          </a:prstGeom>
+        </p:spPr>
+        <p:style>
+          <a:lnRef idx="1">
+            <a:schemeClr val="accent1"/>
+          </a:lnRef>
+          <a:fillRef idx="2">
+            <a:schemeClr val="accent1"/>
+          </a:fillRef>
+          <a:effectRef idx="1">
+            <a:schemeClr val="accent1"/>
+          </a:effectRef>
+          <a:fontRef idx="minor">
+            <a:schemeClr val="dk1"/>
+          </a:fontRef>
+        </p:style>
+        <p:txBody>
+          <a:bodyPr rtlCol="0" anchor="ctr"/>
+          <a:lstStyle/>
+          <a:p>
+            <a:pPr algn="ctr"/>
+            <a:r>
+              <a:rPr lang="en-US" dirty="0" smtClean="0"/>
+              <a:t>s</a:t>
+            </a:r>
+            <a:endParaRPr lang="en-US" dirty="0"/>
+          </a:p>
+        </p:txBody>
+      </p:sp>
+      <p:sp>
+        <p:nvSpPr>
+          <p:cNvPr id="5" name="Oval 4"/>
+          <p:cNvSpPr/>
+          <p:nvPr/>
+        </p:nvSpPr>
+        <p:spPr>
+          <a:xfrm>
+            <a:off x="6501830" y="2804843"/>
+            <a:ext cx="452063" cy="441789"/>
+          </a:xfrm>
+          <a:prstGeom prst="ellipse">
+            <a:avLst/>
+          </a:prstGeom>
+        </p:spPr>
+        <p:style>
+          <a:lnRef idx="1">
+            <a:schemeClr val="accent1"/>
+          </a:lnRef>
+          <a:fillRef idx="2">
+            <a:schemeClr val="accent1"/>
+          </a:fillRef>
+          <a:effectRef idx="1">
+            <a:schemeClr val="accent1"/>
+          </a:effectRef>
+          <a:fontRef idx="minor">
+            <a:schemeClr val="dk1"/>
+          </a:fontRef>
+        </p:style>
+        <p:txBody>
+          <a:bodyPr rtlCol="0" anchor="ctr"/>
+          <a:lstStyle/>
+          <a:p>
+            <a:pPr algn="ctr"/>
+            <a:r>
+              <a:rPr lang="en-US" dirty="0"/>
+              <a:t>t</a:t>
+            </a:r>
+          </a:p>
+        </p:txBody>
+      </p:sp>
+      <p:sp>
+        <p:nvSpPr>
+          <p:cNvPr id="6" name="Oval 5"/>
+          <p:cNvSpPr/>
+          <p:nvPr/>
+        </p:nvSpPr>
+        <p:spPr>
+          <a:xfrm>
+            <a:off x="3789452" y="1241461"/>
+            <a:ext cx="452063" cy="441789"/>
+          </a:xfrm>
+          <a:prstGeom prst="ellipse">
+            <a:avLst/>
+          </a:prstGeom>
+        </p:spPr>
+        <p:style>
+          <a:lnRef idx="1">
+            <a:schemeClr val="accent1"/>
+          </a:lnRef>
+          <a:fillRef idx="2">
+            <a:schemeClr val="accent1"/>
+          </a:fillRef>
+          <a:effectRef idx="1">
+            <a:schemeClr val="accent1"/>
+          </a:effectRef>
+          <a:fontRef idx="minor">
+            <a:schemeClr val="dk1"/>
+          </a:fontRef>
+        </p:style>
+        <p:txBody>
+          <a:bodyPr rtlCol="0" anchor="ctr"/>
+          <a:lstStyle/>
+          <a:p>
+            <a:pPr algn="ctr"/>
+            <a:r>
+              <a:rPr lang="en-US" dirty="0"/>
+              <a:t>1</a:t>
+            </a:r>
+            <a:endParaRPr lang="en-US" dirty="0"/>
+          </a:p>
+        </p:txBody>
+      </p:sp>
+      <p:sp>
+        <p:nvSpPr>
+          <p:cNvPr id="7" name="Oval 6"/>
+          <p:cNvSpPr/>
+          <p:nvPr/>
+        </p:nvSpPr>
+        <p:spPr>
+          <a:xfrm>
+            <a:off x="5402495" y="1236322"/>
+            <a:ext cx="452063" cy="441789"/>
+          </a:xfrm>
+          <a:prstGeom prst="ellipse">
+            <a:avLst/>
+          </a:prstGeom>
+        </p:spPr>
+        <p:style>
+          <a:lnRef idx="1">
+            <a:schemeClr val="accent1"/>
+          </a:lnRef>
+          <a:fillRef idx="2">
+            <a:schemeClr val="accent1"/>
+          </a:fillRef>
+          <a:effectRef idx="1">
+            <a:schemeClr val="accent1"/>
+          </a:effectRef>
+          <a:fontRef idx="minor">
+            <a:schemeClr val="dk1"/>
+          </a:fontRef>
+        </p:style>
+        <p:txBody>
+          <a:bodyPr rtlCol="0" anchor="ctr"/>
+          <a:lstStyle/>
+          <a:p>
+            <a:pPr algn="ctr"/>
+            <a:r>
+              <a:rPr lang="en-US" dirty="0"/>
+              <a:t>2</a:t>
+            </a:r>
+            <a:endParaRPr lang="en-US" dirty="0"/>
+          </a:p>
+        </p:txBody>
+      </p:sp>
+      <p:sp>
+        <p:nvSpPr>
+          <p:cNvPr id="8" name="Oval 7"/>
+          <p:cNvSpPr/>
+          <p:nvPr/>
+        </p:nvSpPr>
+        <p:spPr>
+          <a:xfrm>
+            <a:off x="3789452" y="2162708"/>
+            <a:ext cx="452063" cy="441789"/>
+          </a:xfrm>
+          <a:prstGeom prst="ellipse">
+            <a:avLst/>
+          </a:prstGeom>
+        </p:spPr>
+        <p:style>
+          <a:lnRef idx="1">
+            <a:schemeClr val="accent1"/>
+          </a:lnRef>
+          <a:fillRef idx="2">
+            <a:schemeClr val="accent1"/>
+          </a:fillRef>
+          <a:effectRef idx="1">
+            <a:schemeClr val="accent1"/>
+          </a:effectRef>
+          <a:fontRef idx="minor">
+            <a:schemeClr val="dk1"/>
+          </a:fontRef>
+        </p:style>
+        <p:txBody>
+          <a:bodyPr rtlCol="0" anchor="ctr"/>
+          <a:lstStyle/>
+          <a:p>
+            <a:pPr algn="ctr"/>
+            <a:r>
+              <a:rPr lang="en-US" dirty="0" smtClean="0"/>
+              <a:t>3</a:t>
+            </a:r>
+            <a:endParaRPr lang="en-US" dirty="0"/>
+          </a:p>
+        </p:txBody>
+      </p:sp>
+      <p:sp>
+        <p:nvSpPr>
+          <p:cNvPr id="9" name="Oval 8"/>
+          <p:cNvSpPr/>
+          <p:nvPr/>
+        </p:nvSpPr>
+        <p:spPr>
+          <a:xfrm>
+            <a:off x="3789452" y="3465813"/>
+            <a:ext cx="452063" cy="441789"/>
+          </a:xfrm>
+          <a:prstGeom prst="ellipse">
+            <a:avLst/>
+          </a:prstGeom>
+        </p:spPr>
+        <p:style>
+          <a:lnRef idx="1">
+            <a:schemeClr val="accent1"/>
+          </a:lnRef>
+          <a:fillRef idx="2">
+            <a:schemeClr val="accent1"/>
+          </a:fillRef>
+          <a:effectRef idx="1">
+            <a:schemeClr val="accent1"/>
+          </a:effectRef>
+          <a:fontRef idx="minor">
+            <a:schemeClr val="dk1"/>
+          </a:fontRef>
+        </p:style>
+        <p:txBody>
+          <a:bodyPr rtlCol="0" anchor="ctr"/>
+          <a:lstStyle/>
+          <a:p>
+            <a:pPr algn="ctr"/>
+            <a:r>
+              <a:rPr lang="en-US" dirty="0" smtClean="0"/>
+              <a:t>5</a:t>
+            </a:r>
+            <a:endParaRPr lang="en-US" dirty="0"/>
+          </a:p>
+        </p:txBody>
+      </p:sp>
+      <p:sp>
+        <p:nvSpPr>
+          <p:cNvPr id="10" name="Oval 9"/>
+          <p:cNvSpPr/>
+          <p:nvPr/>
+        </p:nvSpPr>
+        <p:spPr>
+          <a:xfrm>
+            <a:off x="3789452" y="4400762"/>
+            <a:ext cx="452063" cy="441789"/>
+          </a:xfrm>
+          <a:prstGeom prst="ellipse">
+            <a:avLst/>
+          </a:prstGeom>
+        </p:spPr>
+        <p:style>
+          <a:lnRef idx="1">
+            <a:schemeClr val="accent1"/>
+          </a:lnRef>
+          <a:fillRef idx="2">
+            <a:schemeClr val="accent1"/>
+          </a:fillRef>
+          <a:effectRef idx="1">
+            <a:schemeClr val="accent1"/>
+          </a:effectRef>
+          <a:fontRef idx="minor">
+            <a:schemeClr val="dk1"/>
+          </a:fontRef>
+        </p:style>
+        <p:txBody>
+          <a:bodyPr rtlCol="0" anchor="ctr"/>
+          <a:lstStyle/>
+          <a:p>
+            <a:pPr algn="ctr"/>
+            <a:r>
+              <a:rPr lang="en-US" dirty="0" smtClean="0"/>
+              <a:t>7</a:t>
+            </a:r>
+            <a:endParaRPr lang="en-US" dirty="0"/>
+          </a:p>
+        </p:txBody>
+      </p:sp>
+      <p:sp>
+        <p:nvSpPr>
+          <p:cNvPr id="11" name="Oval 10"/>
+          <p:cNvSpPr/>
+          <p:nvPr/>
+        </p:nvSpPr>
+        <p:spPr>
+          <a:xfrm>
+            <a:off x="5402495" y="2162707"/>
+            <a:ext cx="452063" cy="441789"/>
+          </a:xfrm>
+          <a:prstGeom prst="ellipse">
+            <a:avLst/>
+          </a:prstGeom>
+        </p:spPr>
+        <p:style>
+          <a:lnRef idx="1">
+            <a:schemeClr val="accent1"/>
+          </a:lnRef>
+          <a:fillRef idx="2">
+            <a:schemeClr val="accent1"/>
+          </a:fillRef>
+          <a:effectRef idx="1">
+            <a:schemeClr val="accent1"/>
+          </a:effectRef>
+          <a:fontRef idx="minor">
+            <a:schemeClr val="dk1"/>
+          </a:fontRef>
+        </p:style>
+        <p:txBody>
+          <a:bodyPr rtlCol="0" anchor="ctr"/>
+          <a:lstStyle/>
+          <a:p>
+            <a:pPr algn="ctr"/>
+            <a:r>
+              <a:rPr lang="en-US" dirty="0" smtClean="0"/>
+              <a:t>4</a:t>
+            </a:r>
+            <a:endParaRPr lang="en-US" dirty="0"/>
+          </a:p>
+        </p:txBody>
+      </p:sp>
+      <p:sp>
+        <p:nvSpPr>
+          <p:cNvPr id="12" name="Oval 11"/>
+          <p:cNvSpPr/>
+          <p:nvPr/>
+        </p:nvSpPr>
+        <p:spPr>
+          <a:xfrm>
+            <a:off x="5402495" y="3465812"/>
+            <a:ext cx="452063" cy="441789"/>
+          </a:xfrm>
+          <a:prstGeom prst="ellipse">
+            <a:avLst/>
+          </a:prstGeom>
+        </p:spPr>
+        <p:style>
+          <a:lnRef idx="1">
+            <a:schemeClr val="accent1"/>
+          </a:lnRef>
+          <a:fillRef idx="2">
+            <a:schemeClr val="accent1"/>
+          </a:fillRef>
+          <a:effectRef idx="1">
+            <a:schemeClr val="accent1"/>
+          </a:effectRef>
+          <a:fontRef idx="minor">
+            <a:schemeClr val="dk1"/>
+          </a:fontRef>
+        </p:style>
+        <p:txBody>
+          <a:bodyPr rtlCol="0" anchor="ctr"/>
+          <a:lstStyle/>
+          <a:p>
+            <a:pPr algn="ctr"/>
+            <a:r>
+              <a:rPr lang="en-US" dirty="0" smtClean="0"/>
+              <a:t>6</a:t>
+            </a:r>
+            <a:endParaRPr lang="en-US" dirty="0"/>
+          </a:p>
+        </p:txBody>
+      </p:sp>
+      <p:sp>
+        <p:nvSpPr>
+          <p:cNvPr id="13" name="Oval 12"/>
+          <p:cNvSpPr/>
+          <p:nvPr/>
+        </p:nvSpPr>
+        <p:spPr>
+          <a:xfrm>
+            <a:off x="5402495" y="4400761"/>
+            <a:ext cx="452063" cy="441789"/>
+          </a:xfrm>
+          <a:prstGeom prst="ellipse">
+            <a:avLst/>
+          </a:prstGeom>
+        </p:spPr>
+        <p:style>
+          <a:lnRef idx="1">
+            <a:schemeClr val="accent1"/>
+          </a:lnRef>
+          <a:fillRef idx="2">
+            <a:schemeClr val="accent1"/>
+          </a:fillRef>
+          <a:effectRef idx="1">
+            <a:schemeClr val="accent1"/>
+          </a:effectRef>
+          <a:fontRef idx="minor">
+            <a:schemeClr val="dk1"/>
+          </a:fontRef>
+        </p:style>
+        <p:txBody>
+          <a:bodyPr rtlCol="0" anchor="ctr"/>
+          <a:lstStyle/>
+          <a:p>
+            <a:pPr algn="ctr"/>
+            <a:r>
+              <a:rPr lang="en-US" dirty="0" smtClean="0"/>
+              <a:t>8</a:t>
+            </a:r>
+            <a:endParaRPr lang="en-US" dirty="0"/>
+          </a:p>
+        </p:txBody>
+      </p:sp>
+      <p:cxnSp>
+        <p:nvCxnSpPr>
+          <p:cNvPr id="15" name="Straight Arrow Connector 14"/>
+          <p:cNvCxnSpPr>
+            <a:stCxn id="4" idx="0"/>
+            <a:endCxn id="6" idx="2"/>
+          </p:cNvCxnSpPr>
+          <p:nvPr/>
+        </p:nvCxnSpPr>
+        <p:spPr>
+          <a:xfrm flipV="1">
+            <a:off x="3000055" y="1462356"/>
+            <a:ext cx="789397" cy="1342488"/>
+          </a:xfrm>
+          <a:prstGeom prst="straightConnector1">
+            <a:avLst/>
+          </a:prstGeom>
+          <a:ln w="38100">
+            <a:solidFill>
+              <a:schemeClr val="tx1"/>
+            </a:solidFill>
+            <a:tailEnd type="triangle"/>
+          </a:ln>
+        </p:spPr>
+        <p:style>
+          <a:lnRef idx="1">
+            <a:schemeClr val="accent1"/>
+          </a:lnRef>
+          <a:fillRef idx="0">
+            <a:schemeClr val="accent1"/>
+          </a:fillRef>
+          <a:effectRef idx="0">
+            <a:schemeClr val="accent1"/>
+          </a:effectRef>
+          <a:fontRef idx="minor">
+            <a:schemeClr val="tx1"/>
+          </a:fontRef>
+        </p:style>
+      </p:cxnSp>
+      <p:cxnSp>
+        <p:nvCxnSpPr>
+          <p:cNvPr id="16" name="Straight Arrow Connector 15"/>
+          <p:cNvCxnSpPr>
+            <a:stCxn id="4" idx="7"/>
+            <a:endCxn id="8" idx="2"/>
+          </p:cNvCxnSpPr>
+          <p:nvPr/>
+        </p:nvCxnSpPr>
+        <p:spPr>
+          <a:xfrm flipV="1">
+            <a:off x="3159883" y="2383603"/>
+            <a:ext cx="629569" cy="485940"/>
+          </a:xfrm>
+          <a:prstGeom prst="straightConnector1">
+            <a:avLst/>
+          </a:prstGeom>
+          <a:ln w="38100">
+            <a:solidFill>
+              <a:schemeClr val="tx1"/>
+            </a:solidFill>
+            <a:tailEnd type="triangle"/>
+          </a:ln>
+        </p:spPr>
+        <p:style>
+          <a:lnRef idx="1">
+            <a:schemeClr val="accent1"/>
+          </a:lnRef>
+          <a:fillRef idx="0">
+            <a:schemeClr val="accent1"/>
+          </a:fillRef>
+          <a:effectRef idx="0">
+            <a:schemeClr val="accent1"/>
+          </a:effectRef>
+          <a:fontRef idx="minor">
+            <a:schemeClr val="tx1"/>
+          </a:fontRef>
+        </p:style>
+      </p:cxnSp>
+      <p:cxnSp>
+        <p:nvCxnSpPr>
+          <p:cNvPr id="19" name="Straight Arrow Connector 18"/>
+          <p:cNvCxnSpPr>
+            <a:stCxn id="4" idx="5"/>
+            <a:endCxn id="9" idx="2"/>
+          </p:cNvCxnSpPr>
+          <p:nvPr/>
+        </p:nvCxnSpPr>
+        <p:spPr>
+          <a:xfrm>
+            <a:off x="3159883" y="3181934"/>
+            <a:ext cx="629569" cy="504774"/>
+          </a:xfrm>
+          <a:prstGeom prst="straightConnector1">
+            <a:avLst/>
+          </a:prstGeom>
+          <a:ln w="38100">
+            <a:solidFill>
+              <a:schemeClr val="tx1"/>
+            </a:solidFill>
+            <a:tailEnd type="triangle"/>
+          </a:ln>
+        </p:spPr>
+        <p:style>
+          <a:lnRef idx="1">
+            <a:schemeClr val="accent1"/>
+          </a:lnRef>
+          <a:fillRef idx="0">
+            <a:schemeClr val="accent1"/>
+          </a:fillRef>
+          <a:effectRef idx="0">
+            <a:schemeClr val="accent1"/>
+          </a:effectRef>
+          <a:fontRef idx="minor">
+            <a:schemeClr val="tx1"/>
+          </a:fontRef>
+        </p:style>
+      </p:cxnSp>
+      <p:cxnSp>
+        <p:nvCxnSpPr>
+          <p:cNvPr id="22" name="Straight Arrow Connector 21"/>
+          <p:cNvCxnSpPr>
+            <a:stCxn id="4" idx="4"/>
+            <a:endCxn id="10" idx="1"/>
+          </p:cNvCxnSpPr>
+          <p:nvPr/>
+        </p:nvCxnSpPr>
+        <p:spPr>
+          <a:xfrm>
+            <a:off x="3000055" y="3246633"/>
+            <a:ext cx="855600" cy="1218828"/>
+          </a:xfrm>
+          <a:prstGeom prst="straightConnector1">
+            <a:avLst/>
+          </a:prstGeom>
+          <a:ln w="38100">
+            <a:solidFill>
+              <a:schemeClr val="tx1"/>
+            </a:solidFill>
+            <a:tailEnd type="triangle"/>
+          </a:ln>
+        </p:spPr>
+        <p:style>
+          <a:lnRef idx="1">
+            <a:schemeClr val="accent1"/>
+          </a:lnRef>
+          <a:fillRef idx="0">
+            <a:schemeClr val="accent1"/>
+          </a:fillRef>
+          <a:effectRef idx="0">
+            <a:schemeClr val="accent1"/>
+          </a:effectRef>
+          <a:fontRef idx="minor">
+            <a:schemeClr val="tx1"/>
+          </a:fontRef>
+        </p:style>
+      </p:cxnSp>
+      <p:cxnSp>
+        <p:nvCxnSpPr>
+          <p:cNvPr id="25" name="Straight Arrow Connector 24"/>
+          <p:cNvCxnSpPr>
+            <a:stCxn id="6" idx="6"/>
+            <a:endCxn id="7" idx="2"/>
+          </p:cNvCxnSpPr>
+          <p:nvPr/>
+        </p:nvCxnSpPr>
+        <p:spPr>
+          <a:xfrm flipV="1">
+            <a:off x="4241515" y="1457217"/>
+            <a:ext cx="1160980" cy="5139"/>
+          </a:xfrm>
+          <a:prstGeom prst="straightConnector1">
+            <a:avLst/>
+          </a:prstGeom>
+          <a:ln w="38100">
+            <a:solidFill>
+              <a:schemeClr val="tx1"/>
+            </a:solidFill>
+            <a:tailEnd type="triangle"/>
+          </a:ln>
+        </p:spPr>
+        <p:style>
+          <a:lnRef idx="1">
+            <a:schemeClr val="accent1"/>
+          </a:lnRef>
+          <a:fillRef idx="0">
+            <a:schemeClr val="accent1"/>
+          </a:fillRef>
+          <a:effectRef idx="0">
+            <a:schemeClr val="accent1"/>
+          </a:effectRef>
+          <a:fontRef idx="minor">
+            <a:schemeClr val="tx1"/>
+          </a:fontRef>
+        </p:style>
+      </p:cxnSp>
+      <p:cxnSp>
+        <p:nvCxnSpPr>
+          <p:cNvPr id="28" name="Straight Arrow Connector 27"/>
+          <p:cNvCxnSpPr/>
+          <p:nvPr/>
+        </p:nvCxnSpPr>
+        <p:spPr>
+          <a:xfrm flipV="1">
+            <a:off x="4241515" y="2381031"/>
+            <a:ext cx="1160980" cy="5139"/>
+          </a:xfrm>
+          <a:prstGeom prst="straightConnector1">
+            <a:avLst/>
+          </a:prstGeom>
+          <a:ln w="38100">
+            <a:solidFill>
+              <a:schemeClr val="tx1"/>
+            </a:solidFill>
+            <a:tailEnd type="triangle"/>
+          </a:ln>
+        </p:spPr>
+        <p:style>
+          <a:lnRef idx="1">
+            <a:schemeClr val="accent1"/>
+          </a:lnRef>
+          <a:fillRef idx="0">
+            <a:schemeClr val="accent1"/>
+          </a:fillRef>
+          <a:effectRef idx="0">
+            <a:schemeClr val="accent1"/>
+          </a:effectRef>
+          <a:fontRef idx="minor">
+            <a:schemeClr val="tx1"/>
+          </a:fontRef>
+        </p:style>
+      </p:cxnSp>
+      <p:cxnSp>
+        <p:nvCxnSpPr>
+          <p:cNvPr id="29" name="Straight Arrow Connector 28"/>
+          <p:cNvCxnSpPr/>
+          <p:nvPr/>
+        </p:nvCxnSpPr>
+        <p:spPr>
+          <a:xfrm flipV="1">
+            <a:off x="4241515" y="3686706"/>
+            <a:ext cx="1160980" cy="5139"/>
+          </a:xfrm>
+          <a:prstGeom prst="straightConnector1">
+            <a:avLst/>
+          </a:prstGeom>
+          <a:ln w="38100">
+            <a:solidFill>
+              <a:schemeClr val="tx1"/>
+            </a:solidFill>
+            <a:tailEnd type="triangle"/>
+          </a:ln>
+        </p:spPr>
+        <p:style>
+          <a:lnRef idx="1">
+            <a:schemeClr val="accent1"/>
+          </a:lnRef>
+          <a:fillRef idx="0">
+            <a:schemeClr val="accent1"/>
+          </a:fillRef>
+          <a:effectRef idx="0">
+            <a:schemeClr val="accent1"/>
+          </a:effectRef>
+          <a:fontRef idx="minor">
+            <a:schemeClr val="tx1"/>
+          </a:fontRef>
+        </p:style>
+      </p:cxnSp>
+      <p:cxnSp>
+        <p:nvCxnSpPr>
+          <p:cNvPr id="30" name="Straight Arrow Connector 29"/>
+          <p:cNvCxnSpPr/>
+          <p:nvPr/>
+        </p:nvCxnSpPr>
+        <p:spPr>
+          <a:xfrm flipV="1">
+            <a:off x="4241515" y="4621655"/>
+            <a:ext cx="1160980" cy="5139"/>
+          </a:xfrm>
+          <a:prstGeom prst="straightConnector1">
+            <a:avLst/>
+          </a:prstGeom>
+          <a:ln w="38100">
+            <a:solidFill>
+              <a:schemeClr val="tx1"/>
+            </a:solidFill>
+            <a:tailEnd type="triangle"/>
+          </a:ln>
+        </p:spPr>
+        <p:style>
+          <a:lnRef idx="1">
+            <a:schemeClr val="accent1"/>
+          </a:lnRef>
+          <a:fillRef idx="0">
+            <a:schemeClr val="accent1"/>
+          </a:fillRef>
+          <a:effectRef idx="0">
+            <a:schemeClr val="accent1"/>
+          </a:effectRef>
+          <a:fontRef idx="minor">
+            <a:schemeClr val="tx1"/>
+          </a:fontRef>
+        </p:style>
+      </p:cxnSp>
+      <p:cxnSp>
+        <p:nvCxnSpPr>
+          <p:cNvPr id="31" name="Straight Arrow Connector 30"/>
+          <p:cNvCxnSpPr>
+            <a:stCxn id="7" idx="6"/>
+            <a:endCxn id="5" idx="0"/>
+          </p:cNvCxnSpPr>
+          <p:nvPr/>
+        </p:nvCxnSpPr>
+        <p:spPr>
+          <a:xfrm>
+            <a:off x="5854558" y="1457217"/>
+            <a:ext cx="873304" cy="1347626"/>
+          </a:xfrm>
+          <a:prstGeom prst="straightConnector1">
+            <a:avLst/>
+          </a:prstGeom>
+          <a:ln w="38100">
+            <a:solidFill>
+              <a:schemeClr val="tx1"/>
+            </a:solidFill>
+            <a:tailEnd type="triangle"/>
+          </a:ln>
+        </p:spPr>
+        <p:style>
+          <a:lnRef idx="1">
+            <a:schemeClr val="accent1"/>
+          </a:lnRef>
+          <a:fillRef idx="0">
+            <a:schemeClr val="accent1"/>
+          </a:fillRef>
+          <a:effectRef idx="0">
+            <a:schemeClr val="accent1"/>
+          </a:effectRef>
+          <a:fontRef idx="minor">
+            <a:schemeClr val="tx1"/>
+          </a:fontRef>
+        </p:style>
+      </p:cxnSp>
+      <p:cxnSp>
+        <p:nvCxnSpPr>
+          <p:cNvPr id="34" name="Straight Arrow Connector 33"/>
+          <p:cNvCxnSpPr>
+            <a:stCxn id="13" idx="6"/>
+            <a:endCxn id="5" idx="4"/>
+          </p:cNvCxnSpPr>
+          <p:nvPr/>
+        </p:nvCxnSpPr>
+        <p:spPr>
+          <a:xfrm flipV="1">
+            <a:off x="5854558" y="3246632"/>
+            <a:ext cx="873304" cy="1375024"/>
+          </a:xfrm>
+          <a:prstGeom prst="straightConnector1">
+            <a:avLst/>
+          </a:prstGeom>
+          <a:ln w="38100">
+            <a:solidFill>
+              <a:schemeClr val="tx1"/>
+            </a:solidFill>
+            <a:tailEnd type="triangle"/>
+          </a:ln>
+        </p:spPr>
+        <p:style>
+          <a:lnRef idx="1">
+            <a:schemeClr val="accent1"/>
+          </a:lnRef>
+          <a:fillRef idx="0">
+            <a:schemeClr val="accent1"/>
+          </a:fillRef>
+          <a:effectRef idx="0">
+            <a:schemeClr val="accent1"/>
+          </a:effectRef>
+          <a:fontRef idx="minor">
+            <a:schemeClr val="tx1"/>
+          </a:fontRef>
+        </p:style>
+      </p:cxnSp>
+      <p:cxnSp>
+        <p:nvCxnSpPr>
+          <p:cNvPr id="37" name="Straight Arrow Connector 36"/>
+          <p:cNvCxnSpPr>
+            <a:stCxn id="12" idx="6"/>
+            <a:endCxn id="5" idx="3"/>
+          </p:cNvCxnSpPr>
+          <p:nvPr/>
+        </p:nvCxnSpPr>
+        <p:spPr>
+          <a:xfrm flipV="1">
+            <a:off x="5854558" y="3181933"/>
+            <a:ext cx="713475" cy="504774"/>
+          </a:xfrm>
+          <a:prstGeom prst="straightConnector1">
+            <a:avLst/>
+          </a:prstGeom>
+          <a:ln w="38100">
+            <a:solidFill>
+              <a:schemeClr val="tx1"/>
+            </a:solidFill>
+            <a:tailEnd type="triangle"/>
+          </a:ln>
+        </p:spPr>
+        <p:style>
+          <a:lnRef idx="1">
+            <a:schemeClr val="accent1"/>
+          </a:lnRef>
+          <a:fillRef idx="0">
+            <a:schemeClr val="accent1"/>
+          </a:fillRef>
+          <a:effectRef idx="0">
+            <a:schemeClr val="accent1"/>
+          </a:effectRef>
+          <a:fontRef idx="minor">
+            <a:schemeClr val="tx1"/>
+          </a:fontRef>
+        </p:style>
+      </p:cxnSp>
+      <p:cxnSp>
+        <p:nvCxnSpPr>
+          <p:cNvPr id="40" name="Straight Arrow Connector 39"/>
+          <p:cNvCxnSpPr>
+            <a:stCxn id="11" idx="6"/>
+            <a:endCxn id="5" idx="1"/>
+          </p:cNvCxnSpPr>
+          <p:nvPr/>
+        </p:nvCxnSpPr>
+        <p:spPr>
+          <a:xfrm>
+            <a:off x="5854558" y="2383602"/>
+            <a:ext cx="713475" cy="485940"/>
+          </a:xfrm>
+          <a:prstGeom prst="straightConnector1">
+            <a:avLst/>
+          </a:prstGeom>
+          <a:ln w="38100">
+            <a:solidFill>
+              <a:schemeClr val="tx1"/>
+            </a:solidFill>
+            <a:tailEnd type="triangle"/>
+          </a:ln>
+        </p:spPr>
+        <p:style>
+          <a:lnRef idx="1">
+            <a:schemeClr val="accent1"/>
+          </a:lnRef>
+          <a:fillRef idx="0">
+            <a:schemeClr val="accent1"/>
+          </a:fillRef>
+          <a:effectRef idx="0">
+            <a:schemeClr val="accent1"/>
+          </a:effectRef>
+          <a:fontRef idx="minor">
+            <a:schemeClr val="tx1"/>
+          </a:fontRef>
+        </p:style>
+      </p:cxnSp>
+      <p:sp>
+        <p:nvSpPr>
+          <p:cNvPr id="43" name="TextBox 42"/>
+          <p:cNvSpPr txBox="1"/>
+          <p:nvPr/>
+        </p:nvSpPr>
+        <p:spPr>
+          <a:xfrm>
+            <a:off x="2965254" y="1949572"/>
+            <a:ext cx="629569" cy="369332"/>
+          </a:xfrm>
+          <a:prstGeom prst="rect">
+            <a:avLst/>
+          </a:prstGeom>
+          <a:noFill/>
+        </p:spPr>
+        <p:txBody>
+          <a:bodyPr wrap="square" rtlCol="0">
+            <a:spAutoFit/>
+          </a:bodyPr>
+          <a:lstStyle/>
+          <a:p>
+            <a:r>
+              <a:rPr lang="en-US" smtClean="0"/>
+              <a:t>20</a:t>
+            </a:r>
+            <a:endParaRPr lang="en-US"/>
+          </a:p>
+        </p:txBody>
+      </p:sp>
+      <p:sp>
+        <p:nvSpPr>
+          <p:cNvPr id="44" name="TextBox 43"/>
+          <p:cNvSpPr txBox="1"/>
+          <p:nvPr/>
+        </p:nvSpPr>
+        <p:spPr>
+          <a:xfrm>
+            <a:off x="4516070" y="1069771"/>
+            <a:ext cx="629569" cy="369332"/>
+          </a:xfrm>
+          <a:prstGeom prst="rect">
+            <a:avLst/>
+          </a:prstGeom>
+          <a:noFill/>
+        </p:spPr>
+        <p:txBody>
+          <a:bodyPr wrap="square" rtlCol="0">
+            <a:spAutoFit/>
+          </a:bodyPr>
+          <a:lstStyle/>
+          <a:p>
+            <a:r>
+              <a:rPr lang="en-US" dirty="0" smtClean="0"/>
+              <a:t>25</a:t>
+            </a:r>
+            <a:endParaRPr lang="en-US" dirty="0"/>
+          </a:p>
+        </p:txBody>
+      </p:sp>
+      <p:sp>
+        <p:nvSpPr>
+          <p:cNvPr id="45" name="TextBox 44"/>
+          <p:cNvSpPr txBox="1"/>
+          <p:nvPr/>
+        </p:nvSpPr>
+        <p:spPr>
+          <a:xfrm>
+            <a:off x="6187045" y="1604211"/>
+            <a:ext cx="629569" cy="369332"/>
+          </a:xfrm>
+          <a:prstGeom prst="rect">
+            <a:avLst/>
+          </a:prstGeom>
+          <a:noFill/>
+        </p:spPr>
+        <p:txBody>
+          <a:bodyPr wrap="square" rtlCol="0">
+            <a:spAutoFit/>
+          </a:bodyPr>
+          <a:lstStyle/>
+          <a:p>
+            <a:r>
+              <a:rPr lang="en-US" dirty="0" smtClean="0"/>
+              <a:t>30</a:t>
+            </a:r>
+            <a:endParaRPr lang="en-US" dirty="0"/>
+          </a:p>
+        </p:txBody>
+      </p:sp>
+      <p:sp>
+        <p:nvSpPr>
+          <p:cNvPr id="46" name="TextBox 45"/>
+          <p:cNvSpPr txBox="1"/>
+          <p:nvPr/>
+        </p:nvSpPr>
+        <p:spPr>
+          <a:xfrm>
+            <a:off x="4516071" y="2026257"/>
+            <a:ext cx="629569" cy="369332"/>
+          </a:xfrm>
+          <a:prstGeom prst="rect">
+            <a:avLst/>
+          </a:prstGeom>
+          <a:noFill/>
+        </p:spPr>
+        <p:txBody>
+          <a:bodyPr wrap="square" rtlCol="0">
+            <a:spAutoFit/>
+          </a:bodyPr>
+          <a:lstStyle/>
+          <a:p>
+            <a:r>
+              <a:rPr lang="en-US" dirty="0" smtClean="0"/>
+              <a:t>20</a:t>
+            </a:r>
+            <a:endParaRPr lang="en-US" dirty="0"/>
+          </a:p>
+        </p:txBody>
+      </p:sp>
+      <p:sp>
+        <p:nvSpPr>
+          <p:cNvPr id="47" name="TextBox 46"/>
+          <p:cNvSpPr txBox="1"/>
+          <p:nvPr/>
+        </p:nvSpPr>
+        <p:spPr>
+          <a:xfrm>
+            <a:off x="4516070" y="3281146"/>
+            <a:ext cx="629569" cy="369332"/>
+          </a:xfrm>
+          <a:prstGeom prst="rect">
+            <a:avLst/>
+          </a:prstGeom>
+          <a:noFill/>
+        </p:spPr>
+        <p:txBody>
+          <a:bodyPr wrap="square" rtlCol="0">
+            <a:spAutoFit/>
+          </a:bodyPr>
+          <a:lstStyle/>
+          <a:p>
+            <a:r>
+              <a:rPr lang="en-US" dirty="0" smtClean="0"/>
+              <a:t>10</a:t>
+            </a:r>
+            <a:endParaRPr lang="en-US" dirty="0"/>
+          </a:p>
+        </p:txBody>
+      </p:sp>
+      <p:sp>
+        <p:nvSpPr>
+          <p:cNvPr id="48" name="TextBox 47"/>
+          <p:cNvSpPr txBox="1"/>
+          <p:nvPr/>
+        </p:nvSpPr>
+        <p:spPr>
+          <a:xfrm>
+            <a:off x="4516069" y="4216095"/>
+            <a:ext cx="629569" cy="369332"/>
+          </a:xfrm>
+          <a:prstGeom prst="rect">
+            <a:avLst/>
+          </a:prstGeom>
+          <a:noFill/>
+        </p:spPr>
+        <p:txBody>
+          <a:bodyPr wrap="square" rtlCol="0">
+            <a:spAutoFit/>
+          </a:bodyPr>
+          <a:lstStyle/>
+          <a:p>
+            <a:r>
+              <a:rPr lang="en-US" dirty="0" smtClean="0"/>
+              <a:t>12</a:t>
+            </a:r>
+            <a:endParaRPr lang="en-US" dirty="0"/>
+          </a:p>
+        </p:txBody>
+      </p:sp>
+      <p:sp>
+        <p:nvSpPr>
+          <p:cNvPr id="49" name="TextBox 48"/>
+          <p:cNvSpPr txBox="1"/>
+          <p:nvPr/>
+        </p:nvSpPr>
+        <p:spPr>
+          <a:xfrm>
+            <a:off x="3209567" y="2266761"/>
+            <a:ext cx="629569" cy="369332"/>
+          </a:xfrm>
+          <a:prstGeom prst="rect">
+            <a:avLst/>
+          </a:prstGeom>
+          <a:noFill/>
+        </p:spPr>
+        <p:txBody>
+          <a:bodyPr wrap="square" rtlCol="0">
+            <a:spAutoFit/>
+          </a:bodyPr>
+          <a:lstStyle/>
+          <a:p>
+            <a:r>
+              <a:rPr lang="en-US" dirty="0" smtClean="0"/>
+              <a:t>25</a:t>
+            </a:r>
+            <a:endParaRPr lang="en-US" dirty="0"/>
+          </a:p>
+        </p:txBody>
+      </p:sp>
+      <p:sp>
+        <p:nvSpPr>
+          <p:cNvPr id="50" name="TextBox 49"/>
+          <p:cNvSpPr txBox="1"/>
+          <p:nvPr/>
+        </p:nvSpPr>
+        <p:spPr>
+          <a:xfrm>
+            <a:off x="5957894" y="2156985"/>
+            <a:ext cx="629569" cy="369332"/>
+          </a:xfrm>
+          <a:prstGeom prst="rect">
+            <a:avLst/>
+          </a:prstGeom>
+          <a:noFill/>
+        </p:spPr>
+        <p:txBody>
+          <a:bodyPr wrap="square" rtlCol="0">
+            <a:spAutoFit/>
+          </a:bodyPr>
+          <a:lstStyle/>
+          <a:p>
+            <a:r>
+              <a:rPr lang="en-US" dirty="0" smtClean="0"/>
+              <a:t>15</a:t>
+            </a:r>
+            <a:endParaRPr lang="en-US" dirty="0"/>
+          </a:p>
+        </p:txBody>
+      </p:sp>
+      <p:sp>
+        <p:nvSpPr>
+          <p:cNvPr id="51" name="TextBox 50"/>
+          <p:cNvSpPr txBox="1"/>
+          <p:nvPr/>
+        </p:nvSpPr>
+        <p:spPr>
+          <a:xfrm>
+            <a:off x="3314285" y="3046048"/>
+            <a:ext cx="629569" cy="369332"/>
+          </a:xfrm>
+          <a:prstGeom prst="rect">
+            <a:avLst/>
+          </a:prstGeom>
+          <a:noFill/>
+        </p:spPr>
+        <p:txBody>
+          <a:bodyPr wrap="square" rtlCol="0">
+            <a:spAutoFit/>
+          </a:bodyPr>
+          <a:lstStyle/>
+          <a:p>
+            <a:r>
+              <a:rPr lang="en-US" dirty="0" smtClean="0"/>
+              <a:t>23</a:t>
+            </a:r>
+            <a:endParaRPr lang="en-US" dirty="0"/>
+          </a:p>
+        </p:txBody>
+      </p:sp>
+      <p:sp>
+        <p:nvSpPr>
+          <p:cNvPr id="52" name="TextBox 51"/>
+          <p:cNvSpPr txBox="1"/>
+          <p:nvPr/>
+        </p:nvSpPr>
+        <p:spPr>
+          <a:xfrm>
+            <a:off x="3048579" y="3792470"/>
+            <a:ext cx="629569" cy="369332"/>
+          </a:xfrm>
+          <a:prstGeom prst="rect">
+            <a:avLst/>
+          </a:prstGeom>
+          <a:noFill/>
+        </p:spPr>
+        <p:txBody>
+          <a:bodyPr wrap="square" rtlCol="0">
+            <a:spAutoFit/>
+          </a:bodyPr>
+          <a:lstStyle/>
+          <a:p>
+            <a:r>
+              <a:rPr lang="en-US" dirty="0"/>
+              <a:t>5</a:t>
+            </a:r>
+          </a:p>
+        </p:txBody>
+      </p:sp>
+      <p:sp>
+        <p:nvSpPr>
+          <p:cNvPr id="53" name="TextBox 52"/>
+          <p:cNvSpPr txBox="1"/>
+          <p:nvPr/>
+        </p:nvSpPr>
+        <p:spPr>
+          <a:xfrm>
+            <a:off x="5872260" y="3081003"/>
+            <a:ext cx="629569" cy="369332"/>
+          </a:xfrm>
+          <a:prstGeom prst="rect">
+            <a:avLst/>
+          </a:prstGeom>
+          <a:noFill/>
+        </p:spPr>
+        <p:txBody>
+          <a:bodyPr wrap="square" rtlCol="0">
+            <a:spAutoFit/>
+          </a:bodyPr>
+          <a:lstStyle/>
+          <a:p>
+            <a:r>
+              <a:rPr lang="en-US" smtClean="0"/>
+              <a:t>20</a:t>
+            </a:r>
+            <a:endParaRPr lang="en-US" dirty="0"/>
+          </a:p>
+        </p:txBody>
+      </p:sp>
+      <p:sp>
+        <p:nvSpPr>
+          <p:cNvPr id="54" name="TextBox 53"/>
+          <p:cNvSpPr txBox="1"/>
+          <p:nvPr/>
+        </p:nvSpPr>
+        <p:spPr>
+          <a:xfrm>
+            <a:off x="6098292" y="3999098"/>
+            <a:ext cx="629569" cy="369332"/>
+          </a:xfrm>
+          <a:prstGeom prst="rect">
+            <a:avLst/>
+          </a:prstGeom>
+          <a:noFill/>
+        </p:spPr>
+        <p:txBody>
+          <a:bodyPr wrap="square" rtlCol="0">
+            <a:spAutoFit/>
+          </a:bodyPr>
+          <a:lstStyle/>
+          <a:p>
+            <a:r>
+              <a:rPr lang="en-US" dirty="0" smtClean="0"/>
+              <a:t>25</a:t>
+            </a:r>
+            <a:endParaRPr lang="en-US" dirty="0"/>
+          </a:p>
+        </p:txBody>
+      </p:sp>
+      <p:sp>
+        <p:nvSpPr>
+          <p:cNvPr id="55" name="TextBox 54"/>
+          <p:cNvSpPr txBox="1"/>
+          <p:nvPr/>
+        </p:nvSpPr>
+        <p:spPr>
+          <a:xfrm>
+            <a:off x="3899622" y="915524"/>
+            <a:ext cx="629569" cy="369332"/>
+          </a:xfrm>
+          <a:prstGeom prst="rect">
+            <a:avLst/>
+          </a:prstGeom>
+          <a:noFill/>
+        </p:spPr>
+        <p:txBody>
+          <a:bodyPr wrap="square" rtlCol="0">
+            <a:spAutoFit/>
+          </a:bodyPr>
+          <a:lstStyle/>
+          <a:p>
+            <a:r>
+              <a:rPr lang="en-US" dirty="0" smtClean="0">
+                <a:solidFill>
+                  <a:schemeClr val="accent1">
+                    <a:lumMod val="75000"/>
+                  </a:schemeClr>
+                </a:solidFill>
+              </a:rPr>
+              <a:t>P</a:t>
+            </a:r>
+            <a:r>
+              <a:rPr lang="en-US" baseline="-25000" dirty="0" smtClean="0">
+                <a:solidFill>
+                  <a:schemeClr val="accent1">
+                    <a:lumMod val="75000"/>
+                  </a:schemeClr>
+                </a:solidFill>
+              </a:rPr>
+              <a:t>1</a:t>
+            </a:r>
+            <a:endParaRPr lang="en-US" baseline="-25000" dirty="0">
+              <a:solidFill>
+                <a:schemeClr val="accent1">
+                  <a:lumMod val="75000"/>
+                </a:schemeClr>
+              </a:solidFill>
+            </a:endParaRPr>
+          </a:p>
+        </p:txBody>
+      </p:sp>
+      <p:sp>
+        <p:nvSpPr>
+          <p:cNvPr id="56" name="TextBox 55"/>
+          <p:cNvSpPr txBox="1"/>
+          <p:nvPr/>
+        </p:nvSpPr>
+        <p:spPr>
+          <a:xfrm>
+            <a:off x="4181856" y="2392166"/>
+            <a:ext cx="629569" cy="369332"/>
+          </a:xfrm>
+          <a:prstGeom prst="rect">
+            <a:avLst/>
+          </a:prstGeom>
+          <a:noFill/>
+        </p:spPr>
+        <p:txBody>
+          <a:bodyPr wrap="square" rtlCol="0">
+            <a:spAutoFit/>
+          </a:bodyPr>
+          <a:lstStyle/>
+          <a:p>
+            <a:r>
+              <a:rPr lang="en-US" dirty="0" smtClean="0">
+                <a:solidFill>
+                  <a:schemeClr val="accent1">
+                    <a:lumMod val="75000"/>
+                  </a:schemeClr>
+                </a:solidFill>
+              </a:rPr>
+              <a:t>P</a:t>
+            </a:r>
+            <a:r>
+              <a:rPr lang="en-US" baseline="-25000" dirty="0">
+                <a:solidFill>
+                  <a:schemeClr val="accent1">
+                    <a:lumMod val="75000"/>
+                  </a:schemeClr>
+                </a:solidFill>
+              </a:rPr>
+              <a:t>2</a:t>
+            </a:r>
+          </a:p>
+        </p:txBody>
+      </p:sp>
+      <p:sp>
+        <p:nvSpPr>
+          <p:cNvPr id="57" name="TextBox 56"/>
+          <p:cNvSpPr txBox="1"/>
+          <p:nvPr/>
+        </p:nvSpPr>
+        <p:spPr>
+          <a:xfrm>
+            <a:off x="4077708" y="3109642"/>
+            <a:ext cx="629569" cy="369332"/>
+          </a:xfrm>
+          <a:prstGeom prst="rect">
+            <a:avLst/>
+          </a:prstGeom>
+          <a:noFill/>
+        </p:spPr>
+        <p:txBody>
+          <a:bodyPr wrap="square" rtlCol="0">
+            <a:spAutoFit/>
+          </a:bodyPr>
+          <a:lstStyle/>
+          <a:p>
+            <a:r>
+              <a:rPr lang="en-US" dirty="0" smtClean="0">
+                <a:solidFill>
+                  <a:schemeClr val="accent1">
+                    <a:lumMod val="75000"/>
+                  </a:schemeClr>
+                </a:solidFill>
+              </a:rPr>
+              <a:t>P</a:t>
+            </a:r>
+            <a:r>
+              <a:rPr lang="en-US" baseline="-25000" dirty="0" smtClean="0">
+                <a:solidFill>
+                  <a:schemeClr val="accent1">
+                    <a:lumMod val="75000"/>
+                  </a:schemeClr>
+                </a:solidFill>
+              </a:rPr>
+              <a:t>3</a:t>
+            </a:r>
+            <a:endParaRPr lang="en-US" baseline="-25000" dirty="0">
+              <a:solidFill>
+                <a:schemeClr val="accent1">
+                  <a:lumMod val="75000"/>
+                </a:schemeClr>
+              </a:solidFill>
+            </a:endParaRPr>
+          </a:p>
+        </p:txBody>
+      </p:sp>
+      <p:sp>
+        <p:nvSpPr>
+          <p:cNvPr id="58" name="TextBox 57"/>
+          <p:cNvSpPr txBox="1"/>
+          <p:nvPr/>
+        </p:nvSpPr>
+        <p:spPr>
+          <a:xfrm>
+            <a:off x="4086270" y="4774055"/>
+            <a:ext cx="629569" cy="369332"/>
+          </a:xfrm>
+          <a:prstGeom prst="rect">
+            <a:avLst/>
+          </a:prstGeom>
+          <a:noFill/>
+        </p:spPr>
+        <p:txBody>
+          <a:bodyPr wrap="square" rtlCol="0">
+            <a:spAutoFit/>
+          </a:bodyPr>
+          <a:lstStyle/>
+          <a:p>
+            <a:r>
+              <a:rPr lang="en-US" dirty="0" smtClean="0">
+                <a:solidFill>
+                  <a:schemeClr val="accent1">
+                    <a:lumMod val="75000"/>
+                  </a:schemeClr>
+                </a:solidFill>
+              </a:rPr>
+              <a:t>P</a:t>
+            </a:r>
+            <a:r>
+              <a:rPr lang="en-US" baseline="-25000" dirty="0">
+                <a:solidFill>
+                  <a:schemeClr val="accent1">
+                    <a:lumMod val="75000"/>
+                  </a:schemeClr>
+                </a:solidFill>
+              </a:rPr>
+              <a:t>4</a:t>
+            </a:r>
+          </a:p>
+        </p:txBody>
+      </p:sp>
+    </p:spTree>
+    <p:extLst>
+      <p:ext uri="{BB962C8B-B14F-4D97-AF65-F5344CB8AC3E}">
+        <p14:creationId xmlns:p14="http://schemas.microsoft.com/office/powerpoint/2010/main" val="1366610213"/>
+      </p:ext>
+    </p:extLst>
+  </p:cSld>
+  <p:clrMapOvr>
+    <a:masterClrMapping/>
+  </p:clrMapOvr>
+</p:sld>
+</file>
+
 <file path=ppt/theme/theme1.xml><?xml version="1.0" encoding="utf-8"?>
 <a:theme xmlns:a="http://schemas.openxmlformats.org/drawingml/2006/main" name="Office Theme">
   <a:themeElements>

</xml_diff>

<commit_message>
pseudocode written with program package
</commit_message>
<xml_diff>
--- a/specs/flowcharts.pptx
+++ b/specs/flowcharts.pptx
@@ -12168,7 +12168,7 @@
           <a:p>
             <a:fld id="{7A00DDC5-A047-A044-A413-DB805296468B}" type="datetimeFigureOut">
               <a:rPr lang="en-US" smtClean="0"/>
-              <a:t>11/18/18</a:t>
+              <a:t>11/20/18</a:t>
             </a:fld>
             <a:endParaRPr lang="en-US"/>
           </a:p>
@@ -12338,7 +12338,7 @@
           <a:p>
             <a:fld id="{7A00DDC5-A047-A044-A413-DB805296468B}" type="datetimeFigureOut">
               <a:rPr lang="en-US" smtClean="0"/>
-              <a:t>11/18/18</a:t>
+              <a:t>11/20/18</a:t>
             </a:fld>
             <a:endParaRPr lang="en-US"/>
           </a:p>
@@ -12518,7 +12518,7 @@
           <a:p>
             <a:fld id="{7A00DDC5-A047-A044-A413-DB805296468B}" type="datetimeFigureOut">
               <a:rPr lang="en-US" smtClean="0"/>
-              <a:t>11/18/18</a:t>
+              <a:t>11/20/18</a:t>
             </a:fld>
             <a:endParaRPr lang="en-US"/>
           </a:p>
@@ -12688,7 +12688,7 @@
           <a:p>
             <a:fld id="{7A00DDC5-A047-A044-A413-DB805296468B}" type="datetimeFigureOut">
               <a:rPr lang="en-US" smtClean="0"/>
-              <a:t>11/18/18</a:t>
+              <a:t>11/20/18</a:t>
             </a:fld>
             <a:endParaRPr lang="en-US"/>
           </a:p>
@@ -12934,7 +12934,7 @@
           <a:p>
             <a:fld id="{7A00DDC5-A047-A044-A413-DB805296468B}" type="datetimeFigureOut">
               <a:rPr lang="en-US" smtClean="0"/>
-              <a:t>11/18/18</a:t>
+              <a:t>11/20/18</a:t>
             </a:fld>
             <a:endParaRPr lang="en-US"/>
           </a:p>
@@ -13166,7 +13166,7 @@
           <a:p>
             <a:fld id="{7A00DDC5-A047-A044-A413-DB805296468B}" type="datetimeFigureOut">
               <a:rPr lang="en-US" smtClean="0"/>
-              <a:t>11/18/18</a:t>
+              <a:t>11/20/18</a:t>
             </a:fld>
             <a:endParaRPr lang="en-US"/>
           </a:p>
@@ -13533,7 +13533,7 @@
           <a:p>
             <a:fld id="{7A00DDC5-A047-A044-A413-DB805296468B}" type="datetimeFigureOut">
               <a:rPr lang="en-US" smtClean="0"/>
-              <a:t>11/18/18</a:t>
+              <a:t>11/20/18</a:t>
             </a:fld>
             <a:endParaRPr lang="en-US"/>
           </a:p>
@@ -13651,7 +13651,7 @@
           <a:p>
             <a:fld id="{7A00DDC5-A047-A044-A413-DB805296468B}" type="datetimeFigureOut">
               <a:rPr lang="en-US" smtClean="0"/>
-              <a:t>11/18/18</a:t>
+              <a:t>11/20/18</a:t>
             </a:fld>
             <a:endParaRPr lang="en-US"/>
           </a:p>
@@ -13746,7 +13746,7 @@
           <a:p>
             <a:fld id="{7A00DDC5-A047-A044-A413-DB805296468B}" type="datetimeFigureOut">
               <a:rPr lang="en-US" smtClean="0"/>
-              <a:t>11/18/18</a:t>
+              <a:t>11/20/18</a:t>
             </a:fld>
             <a:endParaRPr lang="en-US"/>
           </a:p>
@@ -14023,7 +14023,7 @@
           <a:p>
             <a:fld id="{7A00DDC5-A047-A044-A413-DB805296468B}" type="datetimeFigureOut">
               <a:rPr lang="en-US" smtClean="0"/>
-              <a:t>11/18/18</a:t>
+              <a:t>11/20/18</a:t>
             </a:fld>
             <a:endParaRPr lang="en-US"/>
           </a:p>
@@ -14276,7 +14276,7 @@
           <a:p>
             <a:fld id="{7A00DDC5-A047-A044-A413-DB805296468B}" type="datetimeFigureOut">
               <a:rPr lang="en-US" smtClean="0"/>
-              <a:t>11/18/18</a:t>
+              <a:t>11/20/18</a:t>
             </a:fld>
             <a:endParaRPr lang="en-US"/>
           </a:p>
@@ -14489,7 +14489,7 @@
           <a:p>
             <a:fld id="{7A00DDC5-A047-A044-A413-DB805296468B}" type="datetimeFigureOut">
               <a:rPr lang="en-US" smtClean="0"/>
-              <a:t>11/18/18</a:t>
+              <a:t>11/20/18</a:t>
             </a:fld>
             <a:endParaRPr lang="en-US"/>
           </a:p>
@@ -15187,7 +15187,6 @@
               <a:rPr lang="en-US" dirty="0"/>
               <a:t>1</a:t>
             </a:r>
-            <a:endParaRPr lang="en-US" dirty="0"/>
           </a:p>
         </p:txBody>
       </p:sp>
@@ -15229,7 +15228,6 @@
               <a:rPr lang="en-US" dirty="0"/>
               <a:t>2</a:t>
             </a:r>
-            <a:endParaRPr lang="en-US" dirty="0"/>
           </a:p>
         </p:txBody>
       </p:sp>
@@ -15967,10 +15965,18 @@
           <a:lstStyle/>
           <a:p>
             <a:r>
-              <a:rPr lang="en-US" smtClean="0"/>
+              <a:rPr lang="en-US" b="1" i="1" dirty="0" smtClean="0">
+                <a:solidFill>
+                  <a:srgbClr val="FF0000"/>
+                </a:solidFill>
+              </a:rPr>
               <a:t>20</a:t>
             </a:r>
-            <a:endParaRPr lang="en-US"/>
+            <a:endParaRPr lang="en-US" b="1" i="1" dirty="0">
+              <a:solidFill>
+                <a:srgbClr val="FF0000"/>
+              </a:solidFill>
+            </a:endParaRPr>
           </a:p>
         </p:txBody>
       </p:sp>
@@ -16087,10 +16093,18 @@
           <a:lstStyle/>
           <a:p>
             <a:r>
-              <a:rPr lang="en-US" dirty="0" smtClean="0"/>
+              <a:rPr lang="en-US" b="1" i="1" dirty="0" smtClean="0">
+                <a:solidFill>
+                  <a:srgbClr val="FF0000"/>
+                </a:solidFill>
+              </a:rPr>
               <a:t>10</a:t>
             </a:r>
-            <a:endParaRPr lang="en-US" dirty="0"/>
+            <a:endParaRPr lang="en-US" b="1" i="1" dirty="0">
+              <a:solidFill>
+                <a:srgbClr val="FF0000"/>
+              </a:solidFill>
+            </a:endParaRPr>
           </a:p>
         </p:txBody>
       </p:sp>
@@ -16177,10 +16191,18 @@
           <a:lstStyle/>
           <a:p>
             <a:r>
-              <a:rPr lang="en-US" dirty="0" smtClean="0"/>
+              <a:rPr lang="en-US" b="1" i="1" dirty="0" smtClean="0">
+                <a:solidFill>
+                  <a:srgbClr val="FF0000"/>
+                </a:solidFill>
+              </a:rPr>
               <a:t>15</a:t>
             </a:r>
-            <a:endParaRPr lang="en-US" dirty="0"/>
+            <a:endParaRPr lang="en-US" b="1" i="1" dirty="0">
+              <a:solidFill>
+                <a:srgbClr val="FF0000"/>
+              </a:solidFill>
+            </a:endParaRPr>
           </a:p>
         </p:txBody>
       </p:sp>
@@ -16237,7 +16259,11 @@
           <a:lstStyle/>
           <a:p>
             <a:r>
-              <a:rPr lang="en-US" dirty="0"/>
+              <a:rPr lang="en-US" b="1" i="1" dirty="0">
+                <a:solidFill>
+                  <a:srgbClr val="FF0000"/>
+                </a:solidFill>
+              </a:rPr>
               <a:t>5</a:t>
             </a:r>
           </a:p>

</xml_diff>